<commit_message>
Change the slides a bit
</commit_message>
<xml_diff>
--- a/Slides/1. Day 1 C# Crash Course - Presentation.pptx
+++ b/Slides/1. Day 1 C# Crash Course - Presentation.pptx
@@ -2412,7 +2412,7 @@
 <dgm:dataModel xmlns:dgm="http://schemas.openxmlformats.org/drawingml/2006/diagram" xmlns:a="http://schemas.openxmlformats.org/drawingml/2006/main">
   <dgm:ptLst>
     <dgm:pt modelId="{12D8E7C2-3AA5-46EE-930B-23FD6F6FA86E}" type="doc">
-      <dgm:prSet loTypeId="urn:microsoft.com/office/officeart/2005/8/layout/vList2" loCatId="list" qsTypeId="urn:microsoft.com/office/officeart/2005/8/quickstyle/simple4" qsCatId="simple" csTypeId="urn:microsoft.com/office/officeart/2005/8/colors/colorful2" csCatId="colorful"/>
+      <dgm:prSet loTypeId="urn:microsoft.com/office/officeart/2005/8/layout/vList2" loCatId="list" qsTypeId="urn:microsoft.com/office/officeart/2005/8/quickstyle/simple4" qsCatId="simple" csTypeId="urn:microsoft.com/office/officeart/2005/8/colors/colorful2" csCatId="colorful" phldr="1"/>
       <dgm:spPr/>
       <dgm:t>
         <a:bodyPr/>
@@ -2504,10 +2504,10 @@
         <a:lstStyle/>
         <a:p>
           <a:r>
-            <a:rPr lang="en-US" b="0" i="0"/>
-            <a:t>10 years up until end of 2024</a:t>
+            <a:rPr lang="en-US" b="0" i="0" dirty="0"/>
+            <a:t>~10 years up until end of 2024</a:t>
           </a:r>
-          <a:endParaRPr lang="en-US"/>
+          <a:endParaRPr lang="en-US" dirty="0"/>
         </a:p>
       </dgm:t>
     </dgm:pt>
@@ -2578,10 +2578,10 @@
         <a:lstStyle/>
         <a:p>
           <a:r>
-            <a:rPr lang="en-US" b="0" i="0"/>
-            <a:t>2022 Course Leader with Shaya</a:t>
+            <a:rPr lang="en-US" b="0" i="0" dirty="0"/>
+            <a:t>2022 Co-Course Leader</a:t>
           </a:r>
-          <a:endParaRPr lang="en-US"/>
+          <a:endParaRPr lang="en-US" dirty="0"/>
         </a:p>
       </dgm:t>
     </dgm:pt>
@@ -2822,7 +2822,7 @@
 <dgm:dataModel xmlns:dgm="http://schemas.openxmlformats.org/drawingml/2006/diagram" xmlns:a="http://schemas.openxmlformats.org/drawingml/2006/main">
   <dgm:ptLst>
     <dgm:pt modelId="{F7DB5119-00E5-4477-A069-E73E9B719372}" type="doc">
-      <dgm:prSet loTypeId="urn:microsoft.com/office/officeart/2008/layout/LinedList" loCatId="list" qsTypeId="urn:microsoft.com/office/officeart/2005/8/quickstyle/simple4" qsCatId="simple" csTypeId="urn:microsoft.com/office/officeart/2005/8/colors/accent3_2" csCatId="accent3"/>
+      <dgm:prSet loTypeId="urn:microsoft.com/office/officeart/2008/layout/LinedList" loCatId="list" qsTypeId="urn:microsoft.com/office/officeart/2005/8/quickstyle/simple4" qsCatId="simple" csTypeId="urn:microsoft.com/office/officeart/2005/8/colors/accent3_2" csCatId="accent3" phldr="1"/>
       <dgm:spPr/>
       <dgm:t>
         <a:bodyPr/>
@@ -2877,10 +2877,10 @@
         <a:lstStyle/>
         <a:p>
           <a:r>
-            <a:rPr lang="en-US" b="0" i="0"/>
-            <a:t>Differences from C++, Syntax, OOP, Unit tests, </a:t>
+            <a:rPr lang="en-US" b="0" i="0" dirty="0"/>
+            <a:t>Differences from C++, Syntax, OOP, Unit tests</a:t>
           </a:r>
-          <a:endParaRPr lang="en-US"/>
+          <a:endParaRPr lang="en-US" dirty="0"/>
         </a:p>
       </dgm:t>
     </dgm:pt>
@@ -2914,10 +2914,10 @@
         <a:lstStyle/>
         <a:p>
           <a:r>
-            <a:rPr lang="en-US" b="0" i="0"/>
+            <a:rPr lang="en-US" b="0" i="0" dirty="0"/>
             <a:t>Multi tasking, events, async-await</a:t>
           </a:r>
-          <a:endParaRPr lang="en-US"/>
+          <a:endParaRPr lang="en-US" dirty="0"/>
         </a:p>
       </dgm:t>
     </dgm:pt>
@@ -2951,10 +2951,10 @@
         <a:lstStyle/>
         <a:p>
           <a:r>
-            <a:rPr lang="en-US" b="0" i="0"/>
+            <a:rPr lang="en-US" b="0" i="0" dirty="0"/>
             <a:t>Dependency Injection and IO</a:t>
           </a:r>
-          <a:endParaRPr lang="en-US"/>
+          <a:endParaRPr lang="en-US" dirty="0"/>
         </a:p>
       </dgm:t>
     </dgm:pt>
@@ -3235,10 +3235,14 @@
             <a:defRPr b="1"/>
           </a:pPr>
           <a:r>
+            <a:rPr lang="en-US" b="0" i="0" dirty="0"/>
+            <a:t>Less slides, </a:t>
+          </a:r>
+          <a:r>
             <a:rPr lang="en-US" b="0" i="0"/>
-            <a:t>Less slides, more hands-on</a:t>
+            <a:t>more hands-on</a:t>
           </a:r>
-          <a:endParaRPr lang="en-US"/>
+          <a:endParaRPr lang="en-US" dirty="0"/>
         </a:p>
       </dgm:t>
     </dgm:pt>
@@ -3254,46 +3258,6 @@
       </dgm:t>
     </dgm:pt>
     <dgm:pt modelId="{30E897CA-40EA-496B-AE3C-AAE33AF249B0}" type="sibTrans" cxnId="{1A0EA93F-BB6C-4FF4-9745-72670FE966B3}">
-      <dgm:prSet/>
-      <dgm:spPr/>
-      <dgm:t>
-        <a:bodyPr/>
-        <a:lstStyle/>
-        <a:p>
-          <a:endParaRPr lang="en-US"/>
-        </a:p>
-      </dgm:t>
-    </dgm:pt>
-    <dgm:pt modelId="{DA78773A-ACAA-475A-93FB-D28FDE9D158B}">
-      <dgm:prSet/>
-      <dgm:spPr/>
-      <dgm:t>
-        <a:bodyPr/>
-        <a:lstStyle/>
-        <a:p>
-          <a:pPr>
-            <a:defRPr b="1"/>
-          </a:pPr>
-          <a:r>
-            <a:rPr lang="en-US" b="0" i="0"/>
-            <a:t>Breaks</a:t>
-          </a:r>
-          <a:endParaRPr lang="en-US"/>
-        </a:p>
-      </dgm:t>
-    </dgm:pt>
-    <dgm:pt modelId="{59D7D3E9-5499-4A67-B724-90481EC0E30F}" type="parTrans" cxnId="{AA705056-8380-49EF-9B49-DB23BB0C34F6}">
-      <dgm:prSet/>
-      <dgm:spPr/>
-      <dgm:t>
-        <a:bodyPr/>
-        <a:lstStyle/>
-        <a:p>
-          <a:endParaRPr lang="en-US"/>
-        </a:p>
-      </dgm:t>
-    </dgm:pt>
-    <dgm:pt modelId="{9837BAB0-CC33-4A2D-83AA-DEA3D73B0085}" type="sibTrans" cxnId="{AA705056-8380-49EF-9B49-DB23BB0C34F6}">
       <dgm:prSet/>
       <dgm:spPr/>
       <dgm:t>
@@ -3349,10 +3313,10 @@
         <a:lstStyle/>
         <a:p>
           <a:r>
-            <a:rPr lang="en-US" b="0" i="0"/>
-            <a:t>Ask (collectibly) for small breaks for coffee</a:t>
+            <a:rPr lang="en-US" b="0" i="0" dirty="0"/>
+            <a:t>Ask for coffee breaks</a:t>
           </a:r>
-          <a:endParaRPr lang="en-US"/>
+          <a:endParaRPr lang="en-US" dirty="0"/>
         </a:p>
       </dgm:t>
     </dgm:pt>
@@ -3452,6 +3416,46 @@
       </dgm:t>
     </dgm:pt>
     <dgm:pt modelId="{14F72062-5C04-48B4-BD17-7AEA2E9FB9C4}" type="sibTrans" cxnId="{BE128A4D-E8B5-4C6A-A766-103048865954}">
+      <dgm:prSet/>
+      <dgm:spPr/>
+      <dgm:t>
+        <a:bodyPr/>
+        <a:lstStyle/>
+        <a:p>
+          <a:endParaRPr lang="en-US"/>
+        </a:p>
+      </dgm:t>
+    </dgm:pt>
+    <dgm:pt modelId="{DA78773A-ACAA-475A-93FB-D28FDE9D158B}">
+      <dgm:prSet/>
+      <dgm:spPr/>
+      <dgm:t>
+        <a:bodyPr/>
+        <a:lstStyle/>
+        <a:p>
+          <a:pPr>
+            <a:defRPr b="1"/>
+          </a:pPr>
+          <a:r>
+            <a:rPr lang="en-US" b="0" i="0" dirty="0"/>
+            <a:t>Breaks</a:t>
+          </a:r>
+          <a:endParaRPr lang="en-US" dirty="0"/>
+        </a:p>
+      </dgm:t>
+    </dgm:pt>
+    <dgm:pt modelId="{9837BAB0-CC33-4A2D-83AA-DEA3D73B0085}" type="sibTrans" cxnId="{AA705056-8380-49EF-9B49-DB23BB0C34F6}">
+      <dgm:prSet/>
+      <dgm:spPr/>
+      <dgm:t>
+        <a:bodyPr/>
+        <a:lstStyle/>
+        <a:p>
+          <a:endParaRPr lang="en-US"/>
+        </a:p>
+      </dgm:t>
+    </dgm:pt>
+    <dgm:pt modelId="{59D7D3E9-5499-4A67-B724-90481EC0E30F}" type="parTrans" cxnId="{AA705056-8380-49EF-9B49-DB23BB0C34F6}">
       <dgm:prSet/>
       <dgm:spPr/>
       <dgm:t>
@@ -3580,7 +3584,7 @@
       <dgm:spPr/>
     </dgm:pt>
     <dgm:pt modelId="{6CFDBFDC-A35A-4057-9568-EF4985E25384}" type="pres">
-      <dgm:prSet presAssocID="{DA78773A-ACAA-475A-93FB-D28FDE9D158B}" presName="desTx" presStyleLbl="revTx" presStyleIdx="3" presStyleCnt="8">
+      <dgm:prSet presAssocID="{DA78773A-ACAA-475A-93FB-D28FDE9D158B}" presName="desTx" presStyleLbl="revTx" presStyleIdx="3" presStyleCnt="8" custLinFactNeighborX="-353" custLinFactNeighborY="-63513">
         <dgm:presLayoutVars/>
       </dgm:prSet>
       <dgm:spPr/>
@@ -4032,10 +4036,10 @@
             <a:buNone/>
           </a:pPr>
           <a:r>
-            <a:rPr lang="en-US" sz="2000" b="0" i="0" kern="1200"/>
-            <a:t>10 years up until end of 2024</a:t>
+            <a:rPr lang="en-US" sz="2000" b="0" i="0" kern="1200" dirty="0"/>
+            <a:t>~10 years up until end of 2024</a:t>
           </a:r>
-          <a:endParaRPr lang="en-US" sz="2000" kern="1200"/>
+          <a:endParaRPr lang="en-US" sz="2000" kern="1200" dirty="0"/>
         </a:p>
       </dsp:txBody>
       <dsp:txXfrm>
@@ -4218,10 +4222,10 @@
             <a:buNone/>
           </a:pPr>
           <a:r>
-            <a:rPr lang="en-US" sz="2000" b="0" i="0" kern="1200"/>
-            <a:t>2022 Course Leader with Shaya</a:t>
+            <a:rPr lang="en-US" sz="2000" b="0" i="0" kern="1200" dirty="0"/>
+            <a:t>2022 Co-Course Leader</a:t>
           </a:r>
-          <a:endParaRPr lang="en-US" sz="2000" kern="1200"/>
+          <a:endParaRPr lang="en-US" sz="2000" kern="1200" dirty="0"/>
         </a:p>
       </dsp:txBody>
       <dsp:txXfrm>
@@ -4682,10 +4686,10 @@
             <a:buNone/>
           </a:pPr>
           <a:r>
-            <a:rPr lang="en-US" sz="2600" b="0" i="0" kern="1200"/>
-            <a:t>Differences from C++, Syntax, OOP, Unit tests, </a:t>
+            <a:rPr lang="en-US" sz="2600" b="0" i="0" kern="1200" dirty="0"/>
+            <a:t>Differences from C++, Syntax, OOP, Unit tests</a:t>
           </a:r>
-          <a:endParaRPr lang="en-US" sz="2600" kern="1200"/>
+          <a:endParaRPr lang="en-US" sz="2600" kern="1200" dirty="0"/>
         </a:p>
       </dsp:txBody>
       <dsp:txXfrm>
@@ -4815,10 +4819,10 @@
             <a:buNone/>
           </a:pPr>
           <a:r>
-            <a:rPr lang="en-US" sz="2600" b="0" i="0" kern="1200"/>
+            <a:rPr lang="en-US" sz="2600" b="0" i="0" kern="1200" dirty="0"/>
             <a:t>Multi tasking, events, async-await</a:t>
           </a:r>
-          <a:endParaRPr lang="en-US" sz="2600" kern="1200"/>
+          <a:endParaRPr lang="en-US" sz="2600" kern="1200" dirty="0"/>
         </a:p>
       </dsp:txBody>
       <dsp:txXfrm>
@@ -4948,10 +4952,10 @@
             <a:buNone/>
           </a:pPr>
           <a:r>
-            <a:rPr lang="en-US" sz="2600" b="0" i="0" kern="1200"/>
+            <a:rPr lang="en-US" sz="2600" b="0" i="0" kern="1200" dirty="0"/>
             <a:t>Dependency Injection and IO</a:t>
           </a:r>
-          <a:endParaRPr lang="en-US" sz="2600" kern="1200"/>
+          <a:endParaRPr lang="en-US" sz="2600" kern="1200" dirty="0"/>
         </a:p>
       </dsp:txBody>
       <dsp:txXfrm>
@@ -5244,7 +5248,7 @@
       </dsp:nvSpPr>
       <dsp:spPr>
         <a:xfrm>
-          <a:off x="614772" y="805183"/>
+          <a:off x="614772" y="874042"/>
           <a:ext cx="658546" cy="658546"/>
         </a:xfrm>
         <a:prstGeom prst="rect">
@@ -5293,7 +5297,7 @@
       </dsp:nvSpPr>
       <dsp:spPr>
         <a:xfrm>
-          <a:off x="3264" y="1534854"/>
+          <a:off x="3264" y="1597790"/>
           <a:ext cx="1881562" cy="562952"/>
         </a:xfrm>
         <a:prstGeom prst="rect">
@@ -5337,14 +5341,18 @@
             <a:defRPr b="1"/>
           </a:pPr>
           <a:r>
+            <a:rPr lang="en-US" sz="1400" b="0" i="0" kern="1200" dirty="0"/>
+            <a:t>Less slides, </a:t>
+          </a:r>
+          <a:r>
             <a:rPr lang="en-US" sz="1400" b="0" i="0" kern="1200"/>
-            <a:t>Less slides, more hands-on</a:t>
+            <a:t>more hands-on</a:t>
           </a:r>
-          <a:endParaRPr lang="en-US" sz="1400" kern="1200"/>
+          <a:endParaRPr lang="en-US" sz="1400" kern="1200" dirty="0"/>
         </a:p>
       </dsp:txBody>
       <dsp:txXfrm>
-        <a:off x="3264" y="1534854"/>
+        <a:off x="3264" y="1597790"/>
         <a:ext cx="1881562" cy="562952"/>
       </dsp:txXfrm>
     </dsp:sp>
@@ -5355,8 +5363,8 @@
       </dsp:nvSpPr>
       <dsp:spPr>
         <a:xfrm>
-          <a:off x="3264" y="2130887"/>
-          <a:ext cx="1881562" cy="328336"/>
+          <a:off x="3264" y="2191070"/>
+          <a:ext cx="1881562" cy="199295"/>
         </a:xfrm>
         <a:prstGeom prst="rect">
           <a:avLst/>
@@ -5387,7 +5395,7 @@
       </dsp:nvSpPr>
       <dsp:spPr>
         <a:xfrm>
-          <a:off x="2825608" y="712206"/>
+          <a:off x="2825608" y="772457"/>
           <a:ext cx="658546" cy="658546"/>
         </a:xfrm>
         <a:prstGeom prst="rect">
@@ -5436,7 +5444,7 @@
       </dsp:nvSpPr>
       <dsp:spPr>
         <a:xfrm>
-          <a:off x="2214100" y="1449873"/>
+          <a:off x="2214100" y="1504942"/>
           <a:ext cx="1881562" cy="562952"/>
         </a:xfrm>
         <a:prstGeom prst="rect">
@@ -5480,14 +5488,14 @@
             <a:defRPr b="1"/>
           </a:pPr>
           <a:r>
-            <a:rPr lang="en-US" sz="1400" b="0" i="0" kern="1200"/>
+            <a:rPr lang="en-US" sz="1400" b="0" i="0" kern="1200" dirty="0"/>
             <a:t>Breaks</a:t>
           </a:r>
-          <a:endParaRPr lang="en-US" sz="1400" kern="1200"/>
+          <a:endParaRPr lang="en-US" sz="1400" kern="1200" dirty="0"/>
         </a:p>
       </dsp:txBody>
       <dsp:txXfrm>
-        <a:off x="2214100" y="1449873"/>
+        <a:off x="2214100" y="1504942"/>
         <a:ext cx="1881562" cy="562952"/>
       </dsp:txXfrm>
     </dsp:sp>
@@ -5498,8 +5506,8 @@
       </dsp:nvSpPr>
       <dsp:spPr>
         <a:xfrm>
-          <a:off x="2214100" y="2049625"/>
-          <a:ext cx="1881562" cy="502575"/>
+          <a:off x="2207458" y="1854797"/>
+          <a:ext cx="1881562" cy="389664"/>
         </a:xfrm>
         <a:prstGeom prst="rect">
           <a:avLst/>
@@ -5560,15 +5568,15 @@
             <a:buNone/>
           </a:pPr>
           <a:r>
-            <a:rPr lang="en-US" sz="1100" b="0" i="0" kern="1200"/>
-            <a:t>Ask (collectibly) for small breaks for coffee</a:t>
+            <a:rPr lang="en-US" sz="1100" b="0" i="0" kern="1200" dirty="0"/>
+            <a:t>Ask for coffee breaks</a:t>
           </a:r>
-          <a:endParaRPr lang="en-US" sz="1100" kern="1200"/>
+          <a:endParaRPr lang="en-US" sz="1100" kern="1200" dirty="0"/>
         </a:p>
       </dsp:txBody>
       <dsp:txXfrm>
-        <a:off x="2214100" y="2049625"/>
-        <a:ext cx="1881562" cy="502575"/>
+        <a:off x="2207458" y="1854797"/>
+        <a:ext cx="1881562" cy="389664"/>
       </dsp:txXfrm>
     </dsp:sp>
     <dsp:sp modelId="{61D39204-7A2B-4B25-A334-27FC3075C12E}">
@@ -5578,7 +5586,7 @@
       </dsp:nvSpPr>
       <dsp:spPr>
         <a:xfrm>
-          <a:off x="5036444" y="712206"/>
+          <a:off x="5036444" y="772457"/>
           <a:ext cx="658546" cy="658546"/>
         </a:xfrm>
         <a:prstGeom prst="rect">
@@ -5627,7 +5635,7 @@
       </dsp:nvSpPr>
       <dsp:spPr>
         <a:xfrm>
-          <a:off x="4424936" y="1449873"/>
+          <a:off x="4424936" y="1504942"/>
           <a:ext cx="1881562" cy="562952"/>
         </a:xfrm>
         <a:prstGeom prst="rect">
@@ -5682,7 +5690,7 @@
         </a:p>
       </dsp:txBody>
       <dsp:txXfrm>
-        <a:off x="4424936" y="1449873"/>
+        <a:off x="4424936" y="1504942"/>
         <a:ext cx="1881562" cy="562952"/>
       </dsp:txXfrm>
     </dsp:sp>
@@ -5693,8 +5701,8 @@
       </dsp:nvSpPr>
       <dsp:spPr>
         <a:xfrm>
-          <a:off x="4424936" y="2049625"/>
-          <a:ext cx="1881562" cy="502575"/>
+          <a:off x="4424936" y="2102285"/>
+          <a:ext cx="1881562" cy="389664"/>
         </a:xfrm>
         <a:prstGeom prst="rect">
           <a:avLst/>
@@ -5725,7 +5733,7 @@
       </dsp:nvSpPr>
       <dsp:spPr>
         <a:xfrm>
-          <a:off x="7247280" y="712206"/>
+          <a:off x="7247280" y="772457"/>
           <a:ext cx="658546" cy="658546"/>
         </a:xfrm>
         <a:prstGeom prst="rect">
@@ -5774,7 +5782,7 @@
       </dsp:nvSpPr>
       <dsp:spPr>
         <a:xfrm>
-          <a:off x="6635772" y="1449873"/>
+          <a:off x="6635772" y="1504942"/>
           <a:ext cx="1881562" cy="562952"/>
         </a:xfrm>
         <a:prstGeom prst="rect">
@@ -5825,7 +5833,7 @@
         </a:p>
       </dsp:txBody>
       <dsp:txXfrm>
-        <a:off x="6635772" y="1449873"/>
+        <a:off x="6635772" y="1504942"/>
         <a:ext cx="1881562" cy="562952"/>
       </dsp:txXfrm>
     </dsp:sp>
@@ -5836,8 +5844,8 @@
       </dsp:nvSpPr>
       <dsp:spPr>
         <a:xfrm>
-          <a:off x="6635772" y="2049625"/>
-          <a:ext cx="1881562" cy="502575"/>
+          <a:off x="6635772" y="2102285"/>
+          <a:ext cx="1881562" cy="389664"/>
         </a:xfrm>
         <a:prstGeom prst="rect">
           <a:avLst/>
@@ -10854,7 +10862,11 @@
               </a:spcAft>
               <a:buNone/>
             </a:pPr>
-            <a:endParaRPr/>
+            <a:r>
+              <a:rPr lang="en-US" dirty="0"/>
+              <a:t>What’s CRUD?</a:t>
+            </a:r>
+            <a:endParaRPr dirty="0"/>
           </a:p>
         </p:txBody>
       </p:sp>
@@ -11693,7 +11705,7 @@
             <a:fld id="{B61BEF0D-F0BB-DE4B-95CE-6DB70DBA9567}" type="datetimeFigureOut">
               <a:rPr lang="en-US" dirty="0"/>
               <a:pPr/>
-              <a:t>5/28/2025</a:t>
+              <a:t>6/1/2025</a:t>
             </a:fld>
             <a:endParaRPr lang="en-US" dirty="0"/>
           </a:p>
@@ -11955,7 +11967,7 @@
             <a:fld id="{B61BEF0D-F0BB-DE4B-95CE-6DB70DBA9567}" type="datetimeFigureOut">
               <a:rPr lang="en-US" dirty="0"/>
               <a:pPr/>
-              <a:t>5/28/2025</a:t>
+              <a:t>6/1/2025</a:t>
             </a:fld>
             <a:endParaRPr lang="en-US" dirty="0"/>
           </a:p>
@@ -12280,7 +12292,7 @@
             <a:fld id="{B61BEF0D-F0BB-DE4B-95CE-6DB70DBA9567}" type="datetimeFigureOut">
               <a:rPr lang="en-US" dirty="0"/>
               <a:pPr/>
-              <a:t>5/28/2025</a:t>
+              <a:t>6/1/2025</a:t>
             </a:fld>
             <a:endParaRPr lang="en-US" dirty="0"/>
           </a:p>
@@ -12632,7 +12644,7 @@
             <a:fld id="{B61BEF0D-F0BB-DE4B-95CE-6DB70DBA9567}" type="datetimeFigureOut">
               <a:rPr lang="en-US" dirty="0"/>
               <a:pPr/>
-              <a:t>5/28/2025</a:t>
+              <a:t>6/1/2025</a:t>
             </a:fld>
             <a:endParaRPr lang="en-US" dirty="0"/>
           </a:p>
@@ -12957,7 +12969,7 @@
             <a:fld id="{B61BEF0D-F0BB-DE4B-95CE-6DB70DBA9567}" type="datetimeFigureOut">
               <a:rPr lang="en-US" dirty="0"/>
               <a:pPr/>
-              <a:t>5/28/2025</a:t>
+              <a:t>6/1/2025</a:t>
             </a:fld>
             <a:endParaRPr lang="en-US" dirty="0"/>
           </a:p>
@@ -13361,7 +13373,7 @@
             <a:fld id="{B61BEF0D-F0BB-DE4B-95CE-6DB70DBA9567}" type="datetimeFigureOut">
               <a:rPr lang="en-US" dirty="0"/>
               <a:pPr/>
-              <a:t>5/28/2025</a:t>
+              <a:t>6/1/2025</a:t>
             </a:fld>
             <a:endParaRPr lang="en-US" dirty="0"/>
           </a:p>
@@ -13541,7 +13553,7 @@
           <a:p>
             <a:fld id="{55C6B4A9-1611-4792-9094-5F34BCA07E0B}" type="datetimeFigureOut">
               <a:rPr lang="en-US" dirty="0"/>
-              <a:t>5/28/2025</a:t>
+              <a:t>6/1/2025</a:t>
             </a:fld>
             <a:endParaRPr lang="en-US" dirty="0"/>
           </a:p>
@@ -13732,7 +13744,7 @@
             <a:fld id="{B61BEF0D-F0BB-DE4B-95CE-6DB70DBA9567}" type="datetimeFigureOut">
               <a:rPr lang="en-US" dirty="0"/>
               <a:pPr/>
-              <a:t>5/28/2025</a:t>
+              <a:t>6/1/2025</a:t>
             </a:fld>
             <a:endParaRPr lang="en-US" dirty="0"/>
           </a:p>
@@ -14395,7 +14407,7 @@
             <a:fld id="{B61BEF0D-F0BB-DE4B-95CE-6DB70DBA9567}" type="datetimeFigureOut">
               <a:rPr lang="en-US" dirty="0"/>
               <a:pPr/>
-              <a:t>5/28/2025</a:t>
+              <a:t>6/1/2025</a:t>
             </a:fld>
             <a:endParaRPr lang="en-US" dirty="0"/>
           </a:p>
@@ -14653,7 +14665,7 @@
             <a:fld id="{B61BEF0D-F0BB-DE4B-95CE-6DB70DBA9567}" type="datetimeFigureOut">
               <a:rPr lang="en-US" dirty="0"/>
               <a:pPr/>
-              <a:t>5/28/2025</a:t>
+              <a:t>6/1/2025</a:t>
             </a:fld>
             <a:endParaRPr lang="en-US" dirty="0"/>
           </a:p>
@@ -14895,7 +14907,7 @@
           <a:p>
             <a:fld id="{EB712588-04B1-427B-82EE-E8DB90309F08}" type="datetimeFigureOut">
               <a:rPr lang="en-US" dirty="0"/>
-              <a:t>5/28/2025</a:t>
+              <a:t>6/1/2025</a:t>
             </a:fld>
             <a:endParaRPr lang="en-US" dirty="0"/>
           </a:p>
@@ -15280,7 +15292,7 @@
             <a:fld id="{B61BEF0D-F0BB-DE4B-95CE-6DB70DBA9567}" type="datetimeFigureOut">
               <a:rPr lang="en-US" dirty="0"/>
               <a:pPr/>
-              <a:t>5/28/2025</a:t>
+              <a:t>6/1/2025</a:t>
             </a:fld>
             <a:endParaRPr lang="en-US" dirty="0"/>
           </a:p>
@@ -15414,7 +15426,7 @@
             <a:fld id="{B61BEF0D-F0BB-DE4B-95CE-6DB70DBA9567}" type="datetimeFigureOut">
               <a:rPr lang="en-US" dirty="0"/>
               <a:pPr/>
-              <a:t>5/28/2025</a:t>
+              <a:t>6/1/2025</a:t>
             </a:fld>
             <a:endParaRPr lang="en-US" dirty="0"/>
           </a:p>
@@ -15520,7 +15532,7 @@
             <a:fld id="{B61BEF0D-F0BB-DE4B-95CE-6DB70DBA9567}" type="datetimeFigureOut">
               <a:rPr lang="en-US" dirty="0"/>
               <a:pPr/>
-              <a:t>5/28/2025</a:t>
+              <a:t>6/1/2025</a:t>
             </a:fld>
             <a:endParaRPr lang="en-US" dirty="0"/>
           </a:p>
@@ -15784,7 +15796,7 @@
           <a:p>
             <a:fld id="{42A54C80-263E-416B-A8E0-580EDEADCBDC}" type="datetimeFigureOut">
               <a:rPr lang="en-US" dirty="0"/>
-              <a:t>5/28/2025</a:t>
+              <a:t>6/1/2025</a:t>
             </a:fld>
             <a:endParaRPr lang="en-US" dirty="0"/>
           </a:p>
@@ -16058,7 +16070,7 @@
             <a:fld id="{B61BEF0D-F0BB-DE4B-95CE-6DB70DBA9567}" type="datetimeFigureOut">
               <a:rPr lang="en-US" dirty="0"/>
               <a:pPr/>
-              <a:t>5/28/2025</a:t>
+              <a:t>6/1/2025</a:t>
             </a:fld>
             <a:endParaRPr lang="en-US" dirty="0"/>
           </a:p>
@@ -16812,7 +16824,7 @@
             <a:fld id="{B61BEF0D-F0BB-DE4B-95CE-6DB70DBA9567}" type="datetimeFigureOut">
               <a:rPr lang="en-US" dirty="0"/>
               <a:pPr/>
-              <a:t>5/28/2025</a:t>
+              <a:t>6/1/2025</a:t>
             </a:fld>
             <a:endParaRPr lang="en-US" dirty="0"/>
           </a:p>
@@ -20516,7 +20528,7 @@
           <p:nvPr>
             <p:extLst>
               <p:ext uri="{D42A27DB-BD31-4B8C-83A1-F6EECF244321}">
-                <p14:modId xmlns:p14="http://schemas.microsoft.com/office/powerpoint/2010/main" val="271456478"/>
+                <p14:modId xmlns:p14="http://schemas.microsoft.com/office/powerpoint/2010/main" val="105171322"/>
               </p:ext>
             </p:extLst>
           </p:nvPr>
@@ -20672,7 +20684,7 @@
           <p:nvPr>
             <p:extLst>
               <p:ext uri="{D42A27DB-BD31-4B8C-83A1-F6EECF244321}">
-                <p14:modId xmlns:p14="http://schemas.microsoft.com/office/powerpoint/2010/main" val="4294008465"/>
+                <p14:modId xmlns:p14="http://schemas.microsoft.com/office/powerpoint/2010/main" val="2199636581"/>
               </p:ext>
             </p:extLst>
           </p:nvPr>
@@ -20766,7 +20778,7 @@
           <p:nvPr>
             <p:extLst>
               <p:ext uri="{D42A27DB-BD31-4B8C-83A1-F6EECF244321}">
-                <p14:modId xmlns:p14="http://schemas.microsoft.com/office/powerpoint/2010/main" val="2334260063"/>
+                <p14:modId xmlns:p14="http://schemas.microsoft.com/office/powerpoint/2010/main" val="677762558"/>
               </p:ext>
             </p:extLst>
           </p:nvPr>
@@ -21802,7 +21814,7 @@
               </a:spcBef>
             </a:pPr>
             <a:r>
-              <a:rPr lang="en-US" b="0" i="0" u="none" strike="noStrike" cap="none"/>
+              <a:rPr lang="en-US" b="0" i="0" u="none" strike="noStrike" cap="none" dirty="0"/>
               <a:t>Throughout the course we’ll build a TO-DO list app</a:t>
             </a:r>
           </a:p>
@@ -21813,8 +21825,8 @@
               </a:spcBef>
             </a:pPr>
             <a:r>
-              <a:rPr lang="en-US" b="0" i="0" u="none" strike="noStrike" cap="none"/>
-              <a:t>We’ll support CRUD operations (create, read, update, delete)</a:t>
+              <a:rPr lang="en-US" b="0" i="0" u="none" strike="noStrike" cap="none" dirty="0"/>
+              <a:t>We’ll support CRUD operations</a:t>
             </a:r>
           </a:p>
           <a:p>
@@ -21824,7 +21836,7 @@
               </a:spcBef>
             </a:pPr>
             <a:r>
-              <a:rPr lang="en-US" b="0" i="0" u="none" strike="noStrike" cap="none"/>
+              <a:rPr lang="en-US" b="0" i="0" u="none" strike="noStrike" cap="none" dirty="0"/>
               <a:t>Unit tests</a:t>
             </a:r>
           </a:p>
@@ -21835,7 +21847,7 @@
               </a:spcBef>
             </a:pPr>
             <a:r>
-              <a:rPr lang="en-US" b="0" i="0" u="none" strike="noStrike" cap="none"/>
+              <a:rPr lang="en-US" b="0" i="0" u="none" strike="noStrike" cap="none" dirty="0"/>
               <a:t>Work with C# DI mechanism</a:t>
             </a:r>
           </a:p>
@@ -21846,8 +21858,8 @@
               </a:spcBef>
             </a:pPr>
             <a:r>
-              <a:rPr lang="en-US" b="0" i="0" u="none" strike="noStrike" cap="none"/>
-              <a:t>Refactor into a Web API application</a:t>
+              <a:rPr lang="en-US" b="0" i="0" u="none" strike="noStrike" cap="none" dirty="0"/>
+              <a:t>Start from CLI and refactor to a Web API application</a:t>
             </a:r>
           </a:p>
           <a:p>
@@ -21857,8 +21869,16 @@
               </a:spcBef>
             </a:pPr>
             <a:r>
-              <a:rPr lang="en-US" b="0" i="0" u="none" strike="noStrike" cap="none"/>
-              <a:t>If time allow - We’ll add authentication with JWT and a Cache mechanism (probably not :) )</a:t>
+              <a:rPr lang="en-US" b="0" i="0" u="none" strike="noStrike" cap="none" dirty="0"/>
+              <a:t>If time allow - We’ll add authentication with JWT and a Cache mechanism </a:t>
+            </a:r>
+            <a:r>
+              <a:rPr lang="en-US" sz="800" b="0" i="0" u="none" strike="noStrike" cap="none" dirty="0"/>
+              <a:t>(probably not :) </a:t>
+            </a:r>
+            <a:r>
+              <a:rPr lang="en-US" b="0" i="0" u="none" strike="noStrike" cap="none" dirty="0"/>
+              <a:t>)</a:t>
             </a:r>
           </a:p>
         </p:txBody>

</xml_diff>